<commit_message>
fall 2021 first few weeks
</commit_message>
<xml_diff>
--- a/course_material/week_01/01_Presentation.pptx
+++ b/course_material/week_01/01_Presentation.pptx
@@ -1558,32 +1558,24 @@
     </pc:docChg>
   </pc:docChgLst>
   <pc:docChgLst>
-    <pc:chgData name="Matthew Warner" userId="389b7aa93fe24cc9" providerId="Windows Live" clId="Web-{982466DD-6CA6-4829-8677-8121BEBBE42F}"/>
-    <pc:docChg chg="addSld modSld">
-      <pc:chgData name="Matthew Warner" userId="389b7aa93fe24cc9" providerId="Windows Live" clId="Web-{982466DD-6CA6-4829-8677-8121BEBBE42F}" dt="2020-08-17T21:56:35.533" v="717" actId="20577"/>
+    <pc:chgData name="Matthew Warner" userId="389b7aa93fe24cc9" providerId="Windows Live" clId="Web-{EFA17049-0C7F-48B7-BD93-99B23A522F43}"/>
+    <pc:docChg chg="modSld">
+      <pc:chgData name="Matthew Warner" userId="389b7aa93fe24cc9" providerId="Windows Live" clId="Web-{EFA17049-0C7F-48B7-BD93-99B23A522F43}" dt="2020-08-19T21:56:53.640" v="3" actId="20577"/>
       <pc:docMkLst>
         <pc:docMk/>
       </pc:docMkLst>
-      <pc:sldChg chg="modSp new">
-        <pc:chgData name="Matthew Warner" userId="389b7aa93fe24cc9" providerId="Windows Live" clId="Web-{982466DD-6CA6-4829-8677-8121BEBBE42F}" dt="2020-08-17T21:54:18.167" v="716" actId="20577"/>
+      <pc:sldChg chg="modSp">
+        <pc:chgData name="Matthew Warner" userId="389b7aa93fe24cc9" providerId="Windows Live" clId="Web-{EFA17049-0C7F-48B7-BD93-99B23A522F43}" dt="2020-08-19T21:56:53.640" v="2" actId="20577"/>
         <pc:sldMkLst>
           <pc:docMk/>
-          <pc:sldMk cId="3682780387" sldId="269"/>
+          <pc:sldMk cId="3854308777" sldId="258"/>
         </pc:sldMkLst>
         <pc:spChg chg="mod">
-          <ac:chgData name="Matthew Warner" userId="389b7aa93fe24cc9" providerId="Windows Live" clId="Web-{982466DD-6CA6-4829-8677-8121BEBBE42F}" dt="2020-08-17T21:49:03.040" v="11" actId="1076"/>
+          <ac:chgData name="Matthew Warner" userId="389b7aa93fe24cc9" providerId="Windows Live" clId="Web-{EFA17049-0C7F-48B7-BD93-99B23A522F43}" dt="2020-08-19T21:56:53.640" v="2" actId="20577"/>
           <ac:spMkLst>
             <pc:docMk/>
-            <pc:sldMk cId="3682780387" sldId="269"/>
-            <ac:spMk id="2" creationId="{EF27FBFE-8268-4F9A-BCE8-38B64A24927B}"/>
-          </ac:spMkLst>
-        </pc:spChg>
-        <pc:spChg chg="mod">
-          <ac:chgData name="Matthew Warner" userId="389b7aa93fe24cc9" providerId="Windows Live" clId="Web-{982466DD-6CA6-4829-8677-8121BEBBE42F}" dt="2020-08-17T21:54:18.167" v="716" actId="20577"/>
-          <ac:spMkLst>
-            <pc:docMk/>
-            <pc:sldMk cId="3682780387" sldId="269"/>
-            <ac:spMk id="3" creationId="{1A832535-BBA3-4CE2-8CAC-C3E1EF98EE79}"/>
+            <pc:sldMk cId="3854308777" sldId="258"/>
+            <ac:spMk id="3" creationId="{DE1805A6-F933-491C-96A0-14F614A26A88}"/>
           </ac:spMkLst>
         </pc:spChg>
       </pc:sldChg>
@@ -1661,24 +1653,32 @@
     </pc:docChg>
   </pc:docChgLst>
   <pc:docChgLst>
-    <pc:chgData name="Matthew Warner" userId="389b7aa93fe24cc9" providerId="Windows Live" clId="Web-{EFA17049-0C7F-48B7-BD93-99B23A522F43}"/>
-    <pc:docChg chg="modSld">
-      <pc:chgData name="Matthew Warner" userId="389b7aa93fe24cc9" providerId="Windows Live" clId="Web-{EFA17049-0C7F-48B7-BD93-99B23A522F43}" dt="2020-08-19T21:56:53.640" v="3" actId="20577"/>
+    <pc:chgData name="Matthew Warner" userId="389b7aa93fe24cc9" providerId="Windows Live" clId="Web-{982466DD-6CA6-4829-8677-8121BEBBE42F}"/>
+    <pc:docChg chg="addSld modSld">
+      <pc:chgData name="Matthew Warner" userId="389b7aa93fe24cc9" providerId="Windows Live" clId="Web-{982466DD-6CA6-4829-8677-8121BEBBE42F}" dt="2020-08-17T21:56:35.533" v="717" actId="20577"/>
       <pc:docMkLst>
         <pc:docMk/>
       </pc:docMkLst>
-      <pc:sldChg chg="modSp">
-        <pc:chgData name="Matthew Warner" userId="389b7aa93fe24cc9" providerId="Windows Live" clId="Web-{EFA17049-0C7F-48B7-BD93-99B23A522F43}" dt="2020-08-19T21:56:53.640" v="2" actId="20577"/>
+      <pc:sldChg chg="modSp new">
+        <pc:chgData name="Matthew Warner" userId="389b7aa93fe24cc9" providerId="Windows Live" clId="Web-{982466DD-6CA6-4829-8677-8121BEBBE42F}" dt="2020-08-17T21:54:18.167" v="716" actId="20577"/>
         <pc:sldMkLst>
           <pc:docMk/>
-          <pc:sldMk cId="3854308777" sldId="258"/>
+          <pc:sldMk cId="3682780387" sldId="269"/>
         </pc:sldMkLst>
         <pc:spChg chg="mod">
-          <ac:chgData name="Matthew Warner" userId="389b7aa93fe24cc9" providerId="Windows Live" clId="Web-{EFA17049-0C7F-48B7-BD93-99B23A522F43}" dt="2020-08-19T21:56:53.640" v="2" actId="20577"/>
+          <ac:chgData name="Matthew Warner" userId="389b7aa93fe24cc9" providerId="Windows Live" clId="Web-{982466DD-6CA6-4829-8677-8121BEBBE42F}" dt="2020-08-17T21:49:03.040" v="11" actId="1076"/>
           <ac:spMkLst>
             <pc:docMk/>
-            <pc:sldMk cId="3854308777" sldId="258"/>
-            <ac:spMk id="3" creationId="{DE1805A6-F933-491C-96A0-14F614A26A88}"/>
+            <pc:sldMk cId="3682780387" sldId="269"/>
+            <ac:spMk id="2" creationId="{EF27FBFE-8268-4F9A-BCE8-38B64A24927B}"/>
+          </ac:spMkLst>
+        </pc:spChg>
+        <pc:spChg chg="mod">
+          <ac:chgData name="Matthew Warner" userId="389b7aa93fe24cc9" providerId="Windows Live" clId="Web-{982466DD-6CA6-4829-8677-8121BEBBE42F}" dt="2020-08-17T21:54:18.167" v="716" actId="20577"/>
+          <ac:spMkLst>
+            <pc:docMk/>
+            <pc:sldMk cId="3682780387" sldId="269"/>
+            <ac:spMk id="3" creationId="{1A832535-BBA3-4CE2-8CAC-C3E1EF98EE79}"/>
           </ac:spMkLst>
         </pc:spChg>
       </pc:sldChg>
@@ -2182,7 +2182,7 @@
           <a:p>
             <a:fld id="{0D815154-CDFD-4C23-9D33-E83F0FAADAA2}" type="datetimeFigureOut">
               <a:rPr lang="en-US" smtClean="0"/>
-              <a:t>3/2/2021</a:t>
+              <a:t>9/7/2021</a:t>
             </a:fld>
             <a:endParaRPr lang="en-US"/>
           </a:p>
@@ -2725,7 +2725,7 @@
           <a:p>
             <a:fld id="{4AAD347D-5ACD-4C99-B74B-A9C85AD731AF}" type="datetimeFigureOut">
               <a:rPr lang="en-US" dirty="0"/>
-              <a:t>3/2/2021</a:t>
+              <a:t>9/7/2021</a:t>
             </a:fld>
             <a:endParaRPr lang="en-US"/>
           </a:p>
@@ -2995,7 +2995,7 @@
           <a:p>
             <a:fld id="{4509A250-FF31-4206-8172-F9D3106AACB1}" type="datetimeFigureOut">
               <a:rPr lang="en-US" dirty="0"/>
-              <a:t>3/2/2021</a:t>
+              <a:t>9/7/2021</a:t>
             </a:fld>
             <a:endParaRPr lang="en-US"/>
           </a:p>
@@ -3188,7 +3188,7 @@
           <a:p>
             <a:fld id="{4509A250-FF31-4206-8172-F9D3106AACB1}" type="datetimeFigureOut">
               <a:rPr lang="en-US" dirty="0"/>
-              <a:t>3/2/2021</a:t>
+              <a:t>9/7/2021</a:t>
             </a:fld>
             <a:endParaRPr lang="en-US"/>
           </a:p>
@@ -3460,7 +3460,7 @@
           <a:p>
             <a:fld id="{4509A250-FF31-4206-8172-F9D3106AACB1}" type="datetimeFigureOut">
               <a:rPr lang="en-US" dirty="0"/>
-              <a:t>3/2/2021</a:t>
+              <a:t>9/7/2021</a:t>
             </a:fld>
             <a:endParaRPr lang="en-US"/>
           </a:p>
@@ -3800,7 +3800,7 @@
           <a:p>
             <a:fld id="{4509A250-FF31-4206-8172-F9D3106AACB1}" type="datetimeFigureOut">
               <a:rPr lang="en-US" dirty="0"/>
-              <a:t>3/2/2021</a:t>
+              <a:t>9/7/2021</a:t>
             </a:fld>
             <a:endParaRPr lang="en-US"/>
           </a:p>
@@ -4422,7 +4422,7 @@
           <a:p>
             <a:fld id="{4509A250-FF31-4206-8172-F9D3106AACB1}" type="datetimeFigureOut">
               <a:rPr lang="en-US" dirty="0"/>
-              <a:t>3/2/2021</a:t>
+              <a:t>9/7/2021</a:t>
             </a:fld>
             <a:endParaRPr lang="en-US"/>
           </a:p>
@@ -5269,7 +5269,7 @@
           <a:p>
             <a:fld id="{4509A250-FF31-4206-8172-F9D3106AACB1}" type="datetimeFigureOut">
               <a:rPr lang="en-US" dirty="0"/>
-              <a:t>3/2/2021</a:t>
+              <a:t>9/7/2021</a:t>
             </a:fld>
             <a:endParaRPr lang="en-US"/>
           </a:p>
@@ -5437,7 +5437,7 @@
           <a:p>
             <a:fld id="{4509A250-FF31-4206-8172-F9D3106AACB1}" type="datetimeFigureOut">
               <a:rPr lang="en-US" dirty="0"/>
-              <a:t>3/2/2021</a:t>
+              <a:t>9/7/2021</a:t>
             </a:fld>
             <a:endParaRPr lang="en-US"/>
           </a:p>
@@ -5615,7 +5615,7 @@
           <a:p>
             <a:fld id="{4509A250-FF31-4206-8172-F9D3106AACB1}" type="datetimeFigureOut">
               <a:rPr lang="en-US" dirty="0"/>
-              <a:t>3/2/2021</a:t>
+              <a:t>9/7/2021</a:t>
             </a:fld>
             <a:endParaRPr lang="en-US"/>
           </a:p>
@@ -5783,7 +5783,7 @@
           <a:p>
             <a:fld id="{4509A250-FF31-4206-8172-F9D3106AACB1}" type="datetimeFigureOut">
               <a:rPr lang="en-US" dirty="0"/>
-              <a:t>3/2/2021</a:t>
+              <a:t>9/7/2021</a:t>
             </a:fld>
             <a:endParaRPr lang="en-US"/>
           </a:p>
@@ -6029,7 +6029,7 @@
           <a:p>
             <a:fld id="{9796027F-7875-4030-9381-8BD8C4F21935}" type="datetimeFigureOut">
               <a:rPr lang="en-US" dirty="0"/>
-              <a:t>3/2/2021</a:t>
+              <a:t>9/7/2021</a:t>
             </a:fld>
             <a:endParaRPr lang="en-US"/>
           </a:p>
@@ -6318,7 +6318,7 @@
           <a:p>
             <a:fld id="{9796027F-7875-4030-9381-8BD8C4F21935}" type="datetimeFigureOut">
               <a:rPr lang="en-US" dirty="0"/>
-              <a:t>3/2/2021</a:t>
+              <a:t>9/7/2021</a:t>
             </a:fld>
             <a:endParaRPr lang="en-US"/>
           </a:p>
@@ -6759,7 +6759,7 @@
           <a:p>
             <a:fld id="{9796027F-7875-4030-9381-8BD8C4F21935}" type="datetimeFigureOut">
               <a:rPr lang="en-US" dirty="0"/>
-              <a:t>3/2/2021</a:t>
+              <a:t>9/7/2021</a:t>
             </a:fld>
             <a:endParaRPr lang="en-US"/>
           </a:p>
@@ -6876,7 +6876,7 @@
           <a:p>
             <a:fld id="{4509A250-FF31-4206-8172-F9D3106AACB1}" type="datetimeFigureOut">
               <a:rPr lang="en-US" dirty="0"/>
-              <a:t>3/2/2021</a:t>
+              <a:t>9/7/2021</a:t>
             </a:fld>
             <a:endParaRPr lang="en-US"/>
           </a:p>
@@ -6971,7 +6971,7 @@
           <a:p>
             <a:fld id="{4509A250-FF31-4206-8172-F9D3106AACB1}" type="datetimeFigureOut">
               <a:rPr lang="en-US" dirty="0"/>
-              <a:t>3/2/2021</a:t>
+              <a:t>9/7/2021</a:t>
             </a:fld>
             <a:endParaRPr lang="en-US"/>
           </a:p>
@@ -7248,7 +7248,7 @@
           <a:p>
             <a:fld id="{4509A250-FF31-4206-8172-F9D3106AACB1}" type="datetimeFigureOut">
               <a:rPr lang="en-US" dirty="0"/>
-              <a:t>3/2/2021</a:t>
+              <a:t>9/7/2021</a:t>
             </a:fld>
             <a:endParaRPr lang="en-US"/>
           </a:p>
@@ -7518,7 +7518,7 @@
           <a:p>
             <a:fld id="{4509A250-FF31-4206-8172-F9D3106AACB1}" type="datetimeFigureOut">
               <a:rPr lang="en-US" dirty="0"/>
-              <a:t>3/2/2021</a:t>
+              <a:t>9/7/2021</a:t>
             </a:fld>
             <a:endParaRPr lang="en-US"/>
           </a:p>
@@ -7945,7 +7945,7 @@
           <a:p>
             <a:fld id="{4AAD347D-5ACD-4C99-B74B-A9C85AD731AF}" type="datetimeFigureOut">
               <a:rPr lang="en-US" dirty="0"/>
-              <a:t>3/2/2021</a:t>
+              <a:t>9/7/2021</a:t>
             </a:fld>
             <a:endParaRPr lang="en-US"/>
           </a:p>
@@ -10358,7 +10358,7 @@
             </a:pPr>
             <a:r>
               <a:rPr lang="en-US" dirty="0"/>
-              <a:t>Maggie Maurer</a:t>
+              <a:t>Brittany Minor</a:t>
             </a:r>
           </a:p>
           <a:p>
@@ -10368,7 +10368,7 @@
             </a:pPr>
             <a:r>
               <a:rPr lang="en-US" dirty="0"/>
-              <a:t>Charlie and Julie</a:t>
+              <a:t>Roopa Desai</a:t>
             </a:r>
           </a:p>
           <a:p>

</xml_diff>